<commit_message>
Pushing changes related to krishna image flipper view - Initial commit
</commit_message>
<xml_diff>
--- a/documents/ux/ux_design.pptx
+++ b/documents/ux/ux_design.pptx
@@ -263,7 +263,7 @@
           <a:p>
             <a:fld id="{2F1124BE-28EF-4DFE-B724-B24587F10031}" type="datetimeFigureOut">
               <a:rPr lang="en-IN" smtClean="0"/>
-              <a:t>02-09-2024</a:t>
+              <a:t>07-09-2024</a:t>
             </a:fld>
             <a:endParaRPr lang="en-IN"/>
           </a:p>
@@ -463,7 +463,7 @@
           <a:p>
             <a:fld id="{2F1124BE-28EF-4DFE-B724-B24587F10031}" type="datetimeFigureOut">
               <a:rPr lang="en-IN" smtClean="0"/>
-              <a:t>02-09-2024</a:t>
+              <a:t>07-09-2024</a:t>
             </a:fld>
             <a:endParaRPr lang="en-IN"/>
           </a:p>
@@ -673,7 +673,7 @@
           <a:p>
             <a:fld id="{2F1124BE-28EF-4DFE-B724-B24587F10031}" type="datetimeFigureOut">
               <a:rPr lang="en-IN" smtClean="0"/>
-              <a:t>02-09-2024</a:t>
+              <a:t>07-09-2024</a:t>
             </a:fld>
             <a:endParaRPr lang="en-IN"/>
           </a:p>
@@ -873,7 +873,7 @@
           <a:p>
             <a:fld id="{2F1124BE-28EF-4DFE-B724-B24587F10031}" type="datetimeFigureOut">
               <a:rPr lang="en-IN" smtClean="0"/>
-              <a:t>02-09-2024</a:t>
+              <a:t>07-09-2024</a:t>
             </a:fld>
             <a:endParaRPr lang="en-IN"/>
           </a:p>
@@ -1149,7 +1149,7 @@
           <a:p>
             <a:fld id="{2F1124BE-28EF-4DFE-B724-B24587F10031}" type="datetimeFigureOut">
               <a:rPr lang="en-IN" smtClean="0"/>
-              <a:t>02-09-2024</a:t>
+              <a:t>07-09-2024</a:t>
             </a:fld>
             <a:endParaRPr lang="en-IN"/>
           </a:p>
@@ -1417,7 +1417,7 @@
           <a:p>
             <a:fld id="{2F1124BE-28EF-4DFE-B724-B24587F10031}" type="datetimeFigureOut">
               <a:rPr lang="en-IN" smtClean="0"/>
-              <a:t>02-09-2024</a:t>
+              <a:t>07-09-2024</a:t>
             </a:fld>
             <a:endParaRPr lang="en-IN"/>
           </a:p>
@@ -1832,7 +1832,7 @@
           <a:p>
             <a:fld id="{2F1124BE-28EF-4DFE-B724-B24587F10031}" type="datetimeFigureOut">
               <a:rPr lang="en-IN" smtClean="0"/>
-              <a:t>02-09-2024</a:t>
+              <a:t>07-09-2024</a:t>
             </a:fld>
             <a:endParaRPr lang="en-IN"/>
           </a:p>
@@ -1974,7 +1974,7 @@
           <a:p>
             <a:fld id="{2F1124BE-28EF-4DFE-B724-B24587F10031}" type="datetimeFigureOut">
               <a:rPr lang="en-IN" smtClean="0"/>
-              <a:t>02-09-2024</a:t>
+              <a:t>07-09-2024</a:t>
             </a:fld>
             <a:endParaRPr lang="en-IN"/>
           </a:p>
@@ -2087,7 +2087,7 @@
           <a:p>
             <a:fld id="{2F1124BE-28EF-4DFE-B724-B24587F10031}" type="datetimeFigureOut">
               <a:rPr lang="en-IN" smtClean="0"/>
-              <a:t>02-09-2024</a:t>
+              <a:t>07-09-2024</a:t>
             </a:fld>
             <a:endParaRPr lang="en-IN"/>
           </a:p>
@@ -2400,7 +2400,7 @@
           <a:p>
             <a:fld id="{2F1124BE-28EF-4DFE-B724-B24587F10031}" type="datetimeFigureOut">
               <a:rPr lang="en-IN" smtClean="0"/>
-              <a:t>02-09-2024</a:t>
+              <a:t>07-09-2024</a:t>
             </a:fld>
             <a:endParaRPr lang="en-IN"/>
           </a:p>
@@ -2689,7 +2689,7 @@
           <a:p>
             <a:fld id="{2F1124BE-28EF-4DFE-B724-B24587F10031}" type="datetimeFigureOut">
               <a:rPr lang="en-IN" smtClean="0"/>
-              <a:t>02-09-2024</a:t>
+              <a:t>07-09-2024</a:t>
             </a:fld>
             <a:endParaRPr lang="en-IN"/>
           </a:p>
@@ -2932,7 +2932,7 @@
           <a:p>
             <a:fld id="{2F1124BE-28EF-4DFE-B724-B24587F10031}" type="datetimeFigureOut">
               <a:rPr lang="en-IN" smtClean="0"/>
-              <a:t>02-09-2024</a:t>
+              <a:t>07-09-2024</a:t>
             </a:fld>
             <a:endParaRPr lang="en-IN"/>
           </a:p>
@@ -4123,7 +4123,7 @@
             <a:lstStyle/>
             <a:p>
               <a:pPr algn="ctr"/>
-              <a:endParaRPr lang="en-IN"/>
+              <a:endParaRPr lang="en-IN" dirty="0"/>
             </a:p>
           </p:txBody>
         </p:sp>
@@ -4778,13 +4778,6 @@
           </p:nvPicPr>
           <p:blipFill>
             <a:blip r:embed="rId2">
-              <a:duotone>
-                <a:prstClr val="black"/>
-                <a:srgbClr val="D9C3A5">
-                  <a:tint val="50000"/>
-                  <a:satMod val="180000"/>
-                </a:srgbClr>
-              </a:duotone>
               <a:extLst>
                 <a:ext uri="{BEBA8EAE-BF5A-486C-A8C5-ECC9F3942E4B}">
                   <a14:imgProps xmlns:a14="http://schemas.microsoft.com/office/drawing/2010/main">
@@ -4961,7 +4954,7 @@
             </a:custGeom>
             <a:solidFill>
               <a:srgbClr val="F1E8EB">
-                <a:alpha val="80000"/>
+                <a:alpha val="94902"/>
               </a:srgbClr>
             </a:solidFill>
             <a:ln>
@@ -5040,10 +5033,10 @@
       </p:grpSp>
       <p:grpSp>
         <p:nvGrpSpPr>
-          <p:cNvPr id="11" name="Group 10">
-            <a:extLst>
-              <a:ext uri="{FF2B5EF4-FFF2-40B4-BE49-F238E27FC236}">
-                <a16:creationId xmlns:a16="http://schemas.microsoft.com/office/drawing/2014/main" id="{03327893-4370-00B6-7976-115BD38FF85D}"/>
+          <p:cNvPr id="4" name="Group 3">
+            <a:extLst>
+              <a:ext uri="{FF2B5EF4-FFF2-40B4-BE49-F238E27FC236}">
+                <a16:creationId xmlns:a16="http://schemas.microsoft.com/office/drawing/2014/main" id="{D8C2BFEE-C1FA-56B4-4BAF-4D3D099543CF}"/>
               </a:ext>
             </a:extLst>
           </p:cNvPr>
@@ -5052,18 +5045,18 @@
         </p:nvGrpSpPr>
         <p:grpSpPr>
           <a:xfrm>
-            <a:off x="2158175" y="1542902"/>
-            <a:ext cx="1800000" cy="1800000"/>
-            <a:chOff x="7026890" y="1551334"/>
-            <a:chExt cx="1863778" cy="1831368"/>
+            <a:off x="2018676" y="1533708"/>
+            <a:ext cx="1819051" cy="1800000"/>
+            <a:chOff x="1637676" y="3718109"/>
+            <a:chExt cx="1819051" cy="1800000"/>
           </a:xfrm>
         </p:grpSpPr>
         <p:pic>
           <p:nvPicPr>
-            <p:cNvPr id="9" name="Picture 8">
+            <p:cNvPr id="3" name="Picture 2">
               <a:extLst>
                 <a:ext uri="{FF2B5EF4-FFF2-40B4-BE49-F238E27FC236}">
-                  <a16:creationId xmlns:a16="http://schemas.microsoft.com/office/drawing/2014/main" id="{5BBDB3C1-0A08-CD51-51AE-2ECA3154DD97}"/>
+                  <a16:creationId xmlns:a16="http://schemas.microsoft.com/office/drawing/2014/main" id="{37630DF5-78EF-1055-DEBE-A182471E2BB6}"/>
                 </a:ext>
               </a:extLst>
             </p:cNvPr>
@@ -5080,13 +5073,13 @@
                 </a:ext>
               </a:extLst>
             </a:blip>
-            <a:srcRect t="1775" b="2573"/>
+            <a:srcRect b="31092"/>
             <a:stretch/>
           </p:blipFill>
           <p:spPr>
             <a:xfrm>
-              <a:off x="7030733" y="1551334"/>
-              <a:ext cx="1859935" cy="1828474"/>
+              <a:off x="1656727" y="3718109"/>
+              <a:ext cx="1800000" cy="1800000"/>
             </a:xfrm>
             <a:prstGeom prst="rect">
               <a:avLst/>
@@ -5107,8 +5100,8 @@
           </p:nvSpPr>
           <p:spPr>
             <a:xfrm>
-              <a:off x="7026890" y="2898070"/>
-              <a:ext cx="1863777" cy="484632"/>
+              <a:off x="1637676" y="5041778"/>
+              <a:ext cx="1818000" cy="476331"/>
             </a:xfrm>
             <a:custGeom>
               <a:avLst/>
@@ -5240,7 +5233,7 @@
             </a:custGeom>
             <a:solidFill>
               <a:srgbClr val="F1E8EB">
-                <a:alpha val="80000"/>
+                <a:alpha val="94902"/>
               </a:srgbClr>
             </a:solidFill>
             <a:ln>
@@ -5354,15 +5347,6 @@
           <p:blipFill>
             <a:blip r:embed="rId5">
               <a:extLst>
-                <a:ext uri="{BEBA8EAE-BF5A-486C-A8C5-ECC9F3942E4B}">
-                  <a14:imgProps xmlns:a14="http://schemas.microsoft.com/office/drawing/2010/main">
-                    <a14:imgLayer r:embed="rId6">
-                      <a14:imgEffect>
-                        <a14:brightnessContrast bright="-20000" contrast="-40000"/>
-                      </a14:imgEffect>
-                    </a14:imgLayer>
-                  </a14:imgProps>
-                </a:ext>
                 <a:ext uri="{28A0092B-C50C-407E-A947-70E740481C1C}">
                   <a14:useLocalDpi xmlns:a14="http://schemas.microsoft.com/office/drawing/2010/main" val="0"/>
                 </a:ext>
@@ -5528,11 +5512,13 @@
             </a:custGeom>
             <a:solidFill>
               <a:srgbClr val="F1E8EB">
-                <a:alpha val="80000"/>
+                <a:alpha val="94902"/>
               </a:srgbClr>
             </a:solidFill>
             <a:ln>
-              <a:noFill/>
+              <a:solidFill>
+                <a:srgbClr val="E5D3D9"/>
+              </a:solidFill>
             </a:ln>
           </p:spPr>
           <p:style>

</xml_diff>

<commit_message>
Pushing new background and other alignment and image flip logic changes
</commit_message>
<xml_diff>
--- a/documents/ux/ux_design.pptx
+++ b/documents/ux/ux_design.pptx
@@ -263,7 +263,7 @@
           <a:p>
             <a:fld id="{2F1124BE-28EF-4DFE-B724-B24587F10031}" type="datetimeFigureOut">
               <a:rPr lang="en-IN" smtClean="0"/>
-              <a:t>07-09-2024</a:t>
+              <a:t>10-09-2024</a:t>
             </a:fld>
             <a:endParaRPr lang="en-IN"/>
           </a:p>
@@ -463,7 +463,7 @@
           <a:p>
             <a:fld id="{2F1124BE-28EF-4DFE-B724-B24587F10031}" type="datetimeFigureOut">
               <a:rPr lang="en-IN" smtClean="0"/>
-              <a:t>07-09-2024</a:t>
+              <a:t>10-09-2024</a:t>
             </a:fld>
             <a:endParaRPr lang="en-IN"/>
           </a:p>
@@ -673,7 +673,7 @@
           <a:p>
             <a:fld id="{2F1124BE-28EF-4DFE-B724-B24587F10031}" type="datetimeFigureOut">
               <a:rPr lang="en-IN" smtClean="0"/>
-              <a:t>07-09-2024</a:t>
+              <a:t>10-09-2024</a:t>
             </a:fld>
             <a:endParaRPr lang="en-IN"/>
           </a:p>
@@ -873,7 +873,7 @@
           <a:p>
             <a:fld id="{2F1124BE-28EF-4DFE-B724-B24587F10031}" type="datetimeFigureOut">
               <a:rPr lang="en-IN" smtClean="0"/>
-              <a:t>07-09-2024</a:t>
+              <a:t>10-09-2024</a:t>
             </a:fld>
             <a:endParaRPr lang="en-IN"/>
           </a:p>
@@ -1149,7 +1149,7 @@
           <a:p>
             <a:fld id="{2F1124BE-28EF-4DFE-B724-B24587F10031}" type="datetimeFigureOut">
               <a:rPr lang="en-IN" smtClean="0"/>
-              <a:t>07-09-2024</a:t>
+              <a:t>10-09-2024</a:t>
             </a:fld>
             <a:endParaRPr lang="en-IN"/>
           </a:p>
@@ -1417,7 +1417,7 @@
           <a:p>
             <a:fld id="{2F1124BE-28EF-4DFE-B724-B24587F10031}" type="datetimeFigureOut">
               <a:rPr lang="en-IN" smtClean="0"/>
-              <a:t>07-09-2024</a:t>
+              <a:t>10-09-2024</a:t>
             </a:fld>
             <a:endParaRPr lang="en-IN"/>
           </a:p>
@@ -1832,7 +1832,7 @@
           <a:p>
             <a:fld id="{2F1124BE-28EF-4DFE-B724-B24587F10031}" type="datetimeFigureOut">
               <a:rPr lang="en-IN" smtClean="0"/>
-              <a:t>07-09-2024</a:t>
+              <a:t>10-09-2024</a:t>
             </a:fld>
             <a:endParaRPr lang="en-IN"/>
           </a:p>
@@ -1974,7 +1974,7 @@
           <a:p>
             <a:fld id="{2F1124BE-28EF-4DFE-B724-B24587F10031}" type="datetimeFigureOut">
               <a:rPr lang="en-IN" smtClean="0"/>
-              <a:t>07-09-2024</a:t>
+              <a:t>10-09-2024</a:t>
             </a:fld>
             <a:endParaRPr lang="en-IN"/>
           </a:p>
@@ -2087,7 +2087,7 @@
           <a:p>
             <a:fld id="{2F1124BE-28EF-4DFE-B724-B24587F10031}" type="datetimeFigureOut">
               <a:rPr lang="en-IN" smtClean="0"/>
-              <a:t>07-09-2024</a:t>
+              <a:t>10-09-2024</a:t>
             </a:fld>
             <a:endParaRPr lang="en-IN"/>
           </a:p>
@@ -2400,7 +2400,7 @@
           <a:p>
             <a:fld id="{2F1124BE-28EF-4DFE-B724-B24587F10031}" type="datetimeFigureOut">
               <a:rPr lang="en-IN" smtClean="0"/>
-              <a:t>07-09-2024</a:t>
+              <a:t>10-09-2024</a:t>
             </a:fld>
             <a:endParaRPr lang="en-IN"/>
           </a:p>
@@ -2689,7 +2689,7 @@
           <a:p>
             <a:fld id="{2F1124BE-28EF-4DFE-B724-B24587F10031}" type="datetimeFigureOut">
               <a:rPr lang="en-IN" smtClean="0"/>
-              <a:t>07-09-2024</a:t>
+              <a:t>10-09-2024</a:t>
             </a:fld>
             <a:endParaRPr lang="en-IN"/>
           </a:p>
@@ -2932,7 +2932,7 @@
           <a:p>
             <a:fld id="{2F1124BE-28EF-4DFE-B724-B24587F10031}" type="datetimeFigureOut">
               <a:rPr lang="en-IN" smtClean="0"/>
-              <a:t>07-09-2024</a:t>
+              <a:t>10-09-2024</a:t>
             </a:fld>
             <a:endParaRPr lang="en-IN"/>
           </a:p>
@@ -3898,236 +3898,6 @@
           <a:chExt cx="0" cy="0"/>
         </a:xfrm>
       </p:grpSpPr>
-      <p:grpSp>
-        <p:nvGrpSpPr>
-          <p:cNvPr id="3" name="Group 2">
-            <a:extLst>
-              <a:ext uri="{FF2B5EF4-FFF2-40B4-BE49-F238E27FC236}">
-                <a16:creationId xmlns:a16="http://schemas.microsoft.com/office/drawing/2014/main" id="{A11F52C7-A8FB-E05B-B374-080B899C912C}"/>
-              </a:ext>
-            </a:extLst>
-          </p:cNvPr>
-          <p:cNvGrpSpPr/>
-          <p:nvPr/>
-        </p:nvGrpSpPr>
-        <p:grpSpPr>
-          <a:xfrm>
-            <a:off x="6638101" y="438912"/>
-            <a:ext cx="3464052" cy="6199632"/>
-            <a:chOff x="6638101" y="438912"/>
-            <a:chExt cx="3464052" cy="6199632"/>
-          </a:xfrm>
-        </p:grpSpPr>
-        <p:sp>
-          <p:nvSpPr>
-            <p:cNvPr id="6" name="Rectangle 5">
-              <a:extLst>
-                <a:ext uri="{FF2B5EF4-FFF2-40B4-BE49-F238E27FC236}">
-                  <a16:creationId xmlns:a16="http://schemas.microsoft.com/office/drawing/2014/main" id="{47D4A58B-20EB-E7A8-F27F-8D47468BC8AD}"/>
-                </a:ext>
-              </a:extLst>
-            </p:cNvPr>
-            <p:cNvSpPr/>
-            <p:nvPr/>
-          </p:nvSpPr>
-          <p:spPr>
-            <a:xfrm>
-              <a:off x="6638101" y="438912"/>
-              <a:ext cx="3464052" cy="6199632"/>
-            </a:xfrm>
-            <a:prstGeom prst="rect">
-              <a:avLst/>
-            </a:prstGeom>
-            <a:solidFill>
-              <a:srgbClr val="000186"/>
-            </a:solidFill>
-            <a:ln>
-              <a:noFill/>
-            </a:ln>
-            <a:effectLst/>
-          </p:spPr>
-          <p:style>
-            <a:lnRef idx="2">
-              <a:schemeClr val="accent1">
-                <a:shade val="15000"/>
-              </a:schemeClr>
-            </a:lnRef>
-            <a:fillRef idx="1">
-              <a:schemeClr val="accent1"/>
-            </a:fillRef>
-            <a:effectRef idx="0">
-              <a:schemeClr val="accent1"/>
-            </a:effectRef>
-            <a:fontRef idx="minor">
-              <a:schemeClr val="lt1"/>
-            </a:fontRef>
-          </p:style>
-          <p:txBody>
-            <a:bodyPr rtlCol="0" anchor="ctr"/>
-            <a:lstStyle/>
-            <a:p>
-              <a:pPr algn="ctr"/>
-              <a:endParaRPr lang="en-IN"/>
-            </a:p>
-          </p:txBody>
-        </p:sp>
-        <p:sp>
-          <p:nvSpPr>
-            <p:cNvPr id="4" name="Rectangle 3">
-              <a:extLst>
-                <a:ext uri="{FF2B5EF4-FFF2-40B4-BE49-F238E27FC236}">
-                  <a16:creationId xmlns:a16="http://schemas.microsoft.com/office/drawing/2014/main" id="{3C82CEFC-455A-1556-C5F9-7383482C8BF6}"/>
-                </a:ext>
-              </a:extLst>
-            </p:cNvPr>
-            <p:cNvSpPr/>
-            <p:nvPr/>
-          </p:nvSpPr>
-          <p:spPr>
-            <a:xfrm>
-              <a:off x="6638101" y="3108960"/>
-              <a:ext cx="3464052" cy="3529584"/>
-            </a:xfrm>
-            <a:custGeom>
-              <a:avLst/>
-              <a:gdLst>
-                <a:gd name="connsiteX0" fmla="*/ 0 w 4416552"/>
-                <a:gd name="connsiteY0" fmla="*/ 0 h 3374136"/>
-                <a:gd name="connsiteX1" fmla="*/ 4416552 w 4416552"/>
-                <a:gd name="connsiteY1" fmla="*/ 0 h 3374136"/>
-                <a:gd name="connsiteX2" fmla="*/ 4416552 w 4416552"/>
-                <a:gd name="connsiteY2" fmla="*/ 3374136 h 3374136"/>
-                <a:gd name="connsiteX3" fmla="*/ 0 w 4416552"/>
-                <a:gd name="connsiteY3" fmla="*/ 3374136 h 3374136"/>
-                <a:gd name="connsiteX4" fmla="*/ 0 w 4416552"/>
-                <a:gd name="connsiteY4" fmla="*/ 0 h 3374136"/>
-                <a:gd name="connsiteX0" fmla="*/ 896112 w 4416552"/>
-                <a:gd name="connsiteY0" fmla="*/ 694944 h 3374136"/>
-                <a:gd name="connsiteX1" fmla="*/ 4416552 w 4416552"/>
-                <a:gd name="connsiteY1" fmla="*/ 0 h 3374136"/>
-                <a:gd name="connsiteX2" fmla="*/ 4416552 w 4416552"/>
-                <a:gd name="connsiteY2" fmla="*/ 3374136 h 3374136"/>
-                <a:gd name="connsiteX3" fmla="*/ 0 w 4416552"/>
-                <a:gd name="connsiteY3" fmla="*/ 3374136 h 3374136"/>
-                <a:gd name="connsiteX4" fmla="*/ 896112 w 4416552"/>
-                <a:gd name="connsiteY4" fmla="*/ 694944 h 3374136"/>
-                <a:gd name="connsiteX0" fmla="*/ 896112 w 4416552"/>
-                <a:gd name="connsiteY0" fmla="*/ 694944 h 3374136"/>
-                <a:gd name="connsiteX1" fmla="*/ 4416552 w 4416552"/>
-                <a:gd name="connsiteY1" fmla="*/ 0 h 3374136"/>
-                <a:gd name="connsiteX2" fmla="*/ 4416552 w 4416552"/>
-                <a:gd name="connsiteY2" fmla="*/ 3374136 h 3374136"/>
-                <a:gd name="connsiteX3" fmla="*/ 0 w 4416552"/>
-                <a:gd name="connsiteY3" fmla="*/ 3374136 h 3374136"/>
-                <a:gd name="connsiteX4" fmla="*/ 896112 w 4416552"/>
-                <a:gd name="connsiteY4" fmla="*/ 694944 h 3374136"/>
-                <a:gd name="connsiteX0" fmla="*/ 0 w 4480560"/>
-                <a:gd name="connsiteY0" fmla="*/ 621792 h 3374136"/>
-                <a:gd name="connsiteX1" fmla="*/ 4480560 w 4480560"/>
-                <a:gd name="connsiteY1" fmla="*/ 0 h 3374136"/>
-                <a:gd name="connsiteX2" fmla="*/ 4480560 w 4480560"/>
-                <a:gd name="connsiteY2" fmla="*/ 3374136 h 3374136"/>
-                <a:gd name="connsiteX3" fmla="*/ 64008 w 4480560"/>
-                <a:gd name="connsiteY3" fmla="*/ 3374136 h 3374136"/>
-                <a:gd name="connsiteX4" fmla="*/ 0 w 4480560"/>
-                <a:gd name="connsiteY4" fmla="*/ 621792 h 3374136"/>
-                <a:gd name="connsiteX0" fmla="*/ 91440 w 4416552"/>
-                <a:gd name="connsiteY0" fmla="*/ 621792 h 3374136"/>
-                <a:gd name="connsiteX1" fmla="*/ 4416552 w 4416552"/>
-                <a:gd name="connsiteY1" fmla="*/ 0 h 3374136"/>
-                <a:gd name="connsiteX2" fmla="*/ 4416552 w 4416552"/>
-                <a:gd name="connsiteY2" fmla="*/ 3374136 h 3374136"/>
-                <a:gd name="connsiteX3" fmla="*/ 0 w 4416552"/>
-                <a:gd name="connsiteY3" fmla="*/ 3374136 h 3374136"/>
-                <a:gd name="connsiteX4" fmla="*/ 91440 w 4416552"/>
-                <a:gd name="connsiteY4" fmla="*/ 621792 h 3374136"/>
-                <a:gd name="connsiteX0" fmla="*/ 0 w 4416552"/>
-                <a:gd name="connsiteY0" fmla="*/ 630936 h 3374136"/>
-                <a:gd name="connsiteX1" fmla="*/ 4416552 w 4416552"/>
-                <a:gd name="connsiteY1" fmla="*/ 0 h 3374136"/>
-                <a:gd name="connsiteX2" fmla="*/ 4416552 w 4416552"/>
-                <a:gd name="connsiteY2" fmla="*/ 3374136 h 3374136"/>
-                <a:gd name="connsiteX3" fmla="*/ 0 w 4416552"/>
-                <a:gd name="connsiteY3" fmla="*/ 3374136 h 3374136"/>
-                <a:gd name="connsiteX4" fmla="*/ 0 w 4416552"/>
-                <a:gd name="connsiteY4" fmla="*/ 630936 h 3374136"/>
-              </a:gdLst>
-              <a:ahLst/>
-              <a:cxnLst>
-                <a:cxn ang="0">
-                  <a:pos x="connsiteX0" y="connsiteY0"/>
-                </a:cxn>
-                <a:cxn ang="0">
-                  <a:pos x="connsiteX1" y="connsiteY1"/>
-                </a:cxn>
-                <a:cxn ang="0">
-                  <a:pos x="connsiteX2" y="connsiteY2"/>
-                </a:cxn>
-                <a:cxn ang="0">
-                  <a:pos x="connsiteX3" y="connsiteY3"/>
-                </a:cxn>
-                <a:cxn ang="0">
-                  <a:pos x="connsiteX4" y="connsiteY4"/>
-                </a:cxn>
-              </a:cxnLst>
-              <a:rect l="l" t="t" r="r" b="b"/>
-              <a:pathLst>
-                <a:path w="4416552" h="3374136">
-                  <a:moveTo>
-                    <a:pt x="0" y="630936"/>
-                  </a:moveTo>
-                  <a:cubicBezTo>
-                    <a:pt x="2517648" y="1633728"/>
-                    <a:pt x="3243072" y="231648"/>
-                    <a:pt x="4416552" y="0"/>
-                  </a:cubicBezTo>
-                  <a:lnTo>
-                    <a:pt x="4416552" y="3374136"/>
-                  </a:lnTo>
-                  <a:lnTo>
-                    <a:pt x="0" y="3374136"/>
-                  </a:lnTo>
-                  <a:lnTo>
-                    <a:pt x="0" y="630936"/>
-                  </a:lnTo>
-                  <a:close/>
-                </a:path>
-              </a:pathLst>
-            </a:custGeom>
-            <a:solidFill>
-              <a:srgbClr val="F1E8EB"/>
-            </a:solidFill>
-            <a:ln>
-              <a:noFill/>
-            </a:ln>
-            <a:effectLst/>
-          </p:spPr>
-          <p:style>
-            <a:lnRef idx="2">
-              <a:schemeClr val="accent1">
-                <a:shade val="15000"/>
-              </a:schemeClr>
-            </a:lnRef>
-            <a:fillRef idx="1">
-              <a:schemeClr val="accent1"/>
-            </a:fillRef>
-            <a:effectRef idx="0">
-              <a:schemeClr val="accent1"/>
-            </a:effectRef>
-            <a:fontRef idx="minor">
-              <a:schemeClr val="lt1"/>
-            </a:fontRef>
-          </p:style>
-          <p:txBody>
-            <a:bodyPr rtlCol="0" anchor="ctr"/>
-            <a:lstStyle/>
-            <a:p>
-              <a:pPr algn="ctr"/>
-              <a:endParaRPr lang="en-IN" dirty="0"/>
-            </a:p>
-          </p:txBody>
-        </p:sp>
-      </p:grpSp>
       <p:sp>
         <p:nvSpPr>
           <p:cNvPr id="16" name="Rectangle 15">
@@ -4712,6 +4482,394 @@
           </p:txBody>
         </p:sp>
       </p:grpSp>
+      <p:sp>
+        <p:nvSpPr>
+          <p:cNvPr id="6" name="Rectangle 5">
+            <a:extLst>
+              <a:ext uri="{FF2B5EF4-FFF2-40B4-BE49-F238E27FC236}">
+                <a16:creationId xmlns:a16="http://schemas.microsoft.com/office/drawing/2014/main" id="{47D4A58B-20EB-E7A8-F27F-8D47468BC8AD}"/>
+              </a:ext>
+            </a:extLst>
+          </p:cNvPr>
+          <p:cNvSpPr/>
+          <p:nvPr/>
+        </p:nvSpPr>
+        <p:spPr>
+          <a:xfrm>
+            <a:off x="6638101" y="438912"/>
+            <a:ext cx="3464052" cy="6199632"/>
+          </a:xfrm>
+          <a:prstGeom prst="rect">
+            <a:avLst/>
+          </a:prstGeom>
+          <a:gradFill flip="none" rotWithShape="1">
+            <a:gsLst>
+              <a:gs pos="0">
+                <a:srgbClr val="000186">
+                  <a:shade val="30000"/>
+                  <a:satMod val="115000"/>
+                </a:srgbClr>
+              </a:gs>
+              <a:gs pos="50000">
+                <a:srgbClr val="000186">
+                  <a:shade val="67500"/>
+                  <a:satMod val="115000"/>
+                </a:srgbClr>
+              </a:gs>
+              <a:gs pos="100000">
+                <a:srgbClr val="000186">
+                  <a:shade val="100000"/>
+                  <a:satMod val="115000"/>
+                </a:srgbClr>
+              </a:gs>
+            </a:gsLst>
+            <a:path path="circle">
+              <a:fillToRect l="100000" b="100000"/>
+            </a:path>
+            <a:tileRect t="-100000" r="-100000"/>
+          </a:gradFill>
+          <a:ln>
+            <a:noFill/>
+          </a:ln>
+          <a:effectLst/>
+        </p:spPr>
+        <p:style>
+          <a:lnRef idx="2">
+            <a:schemeClr val="accent1">
+              <a:shade val="15000"/>
+            </a:schemeClr>
+          </a:lnRef>
+          <a:fillRef idx="1">
+            <a:schemeClr val="accent1"/>
+          </a:fillRef>
+          <a:effectRef idx="0">
+            <a:schemeClr val="accent1"/>
+          </a:effectRef>
+          <a:fontRef idx="minor">
+            <a:schemeClr val="lt1"/>
+          </a:fontRef>
+        </p:style>
+        <p:txBody>
+          <a:bodyPr rtlCol="0" anchor="ctr"/>
+          <a:lstStyle/>
+          <a:p>
+            <a:pPr algn="ctr"/>
+            <a:endParaRPr lang="en-IN"/>
+          </a:p>
+        </p:txBody>
+      </p:sp>
+      <p:sp>
+        <p:nvSpPr>
+          <p:cNvPr id="4" name="Rectangle 3">
+            <a:extLst>
+              <a:ext uri="{FF2B5EF4-FFF2-40B4-BE49-F238E27FC236}">
+                <a16:creationId xmlns:a16="http://schemas.microsoft.com/office/drawing/2014/main" id="{3C82CEFC-455A-1556-C5F9-7383482C8BF6}"/>
+              </a:ext>
+            </a:extLst>
+          </p:cNvPr>
+          <p:cNvSpPr/>
+          <p:nvPr/>
+        </p:nvSpPr>
+        <p:spPr>
+          <a:xfrm>
+            <a:off x="6638101" y="2898648"/>
+            <a:ext cx="3464052" cy="3739896"/>
+          </a:xfrm>
+          <a:custGeom>
+            <a:avLst/>
+            <a:gdLst>
+              <a:gd name="connsiteX0" fmla="*/ 0 w 4416552"/>
+              <a:gd name="connsiteY0" fmla="*/ 0 h 3374136"/>
+              <a:gd name="connsiteX1" fmla="*/ 4416552 w 4416552"/>
+              <a:gd name="connsiteY1" fmla="*/ 0 h 3374136"/>
+              <a:gd name="connsiteX2" fmla="*/ 4416552 w 4416552"/>
+              <a:gd name="connsiteY2" fmla="*/ 3374136 h 3374136"/>
+              <a:gd name="connsiteX3" fmla="*/ 0 w 4416552"/>
+              <a:gd name="connsiteY3" fmla="*/ 3374136 h 3374136"/>
+              <a:gd name="connsiteX4" fmla="*/ 0 w 4416552"/>
+              <a:gd name="connsiteY4" fmla="*/ 0 h 3374136"/>
+              <a:gd name="connsiteX0" fmla="*/ 896112 w 4416552"/>
+              <a:gd name="connsiteY0" fmla="*/ 694944 h 3374136"/>
+              <a:gd name="connsiteX1" fmla="*/ 4416552 w 4416552"/>
+              <a:gd name="connsiteY1" fmla="*/ 0 h 3374136"/>
+              <a:gd name="connsiteX2" fmla="*/ 4416552 w 4416552"/>
+              <a:gd name="connsiteY2" fmla="*/ 3374136 h 3374136"/>
+              <a:gd name="connsiteX3" fmla="*/ 0 w 4416552"/>
+              <a:gd name="connsiteY3" fmla="*/ 3374136 h 3374136"/>
+              <a:gd name="connsiteX4" fmla="*/ 896112 w 4416552"/>
+              <a:gd name="connsiteY4" fmla="*/ 694944 h 3374136"/>
+              <a:gd name="connsiteX0" fmla="*/ 896112 w 4416552"/>
+              <a:gd name="connsiteY0" fmla="*/ 694944 h 3374136"/>
+              <a:gd name="connsiteX1" fmla="*/ 4416552 w 4416552"/>
+              <a:gd name="connsiteY1" fmla="*/ 0 h 3374136"/>
+              <a:gd name="connsiteX2" fmla="*/ 4416552 w 4416552"/>
+              <a:gd name="connsiteY2" fmla="*/ 3374136 h 3374136"/>
+              <a:gd name="connsiteX3" fmla="*/ 0 w 4416552"/>
+              <a:gd name="connsiteY3" fmla="*/ 3374136 h 3374136"/>
+              <a:gd name="connsiteX4" fmla="*/ 896112 w 4416552"/>
+              <a:gd name="connsiteY4" fmla="*/ 694944 h 3374136"/>
+              <a:gd name="connsiteX0" fmla="*/ 0 w 4480560"/>
+              <a:gd name="connsiteY0" fmla="*/ 621792 h 3374136"/>
+              <a:gd name="connsiteX1" fmla="*/ 4480560 w 4480560"/>
+              <a:gd name="connsiteY1" fmla="*/ 0 h 3374136"/>
+              <a:gd name="connsiteX2" fmla="*/ 4480560 w 4480560"/>
+              <a:gd name="connsiteY2" fmla="*/ 3374136 h 3374136"/>
+              <a:gd name="connsiteX3" fmla="*/ 64008 w 4480560"/>
+              <a:gd name="connsiteY3" fmla="*/ 3374136 h 3374136"/>
+              <a:gd name="connsiteX4" fmla="*/ 0 w 4480560"/>
+              <a:gd name="connsiteY4" fmla="*/ 621792 h 3374136"/>
+              <a:gd name="connsiteX0" fmla="*/ 91440 w 4416552"/>
+              <a:gd name="connsiteY0" fmla="*/ 621792 h 3374136"/>
+              <a:gd name="connsiteX1" fmla="*/ 4416552 w 4416552"/>
+              <a:gd name="connsiteY1" fmla="*/ 0 h 3374136"/>
+              <a:gd name="connsiteX2" fmla="*/ 4416552 w 4416552"/>
+              <a:gd name="connsiteY2" fmla="*/ 3374136 h 3374136"/>
+              <a:gd name="connsiteX3" fmla="*/ 0 w 4416552"/>
+              <a:gd name="connsiteY3" fmla="*/ 3374136 h 3374136"/>
+              <a:gd name="connsiteX4" fmla="*/ 91440 w 4416552"/>
+              <a:gd name="connsiteY4" fmla="*/ 621792 h 3374136"/>
+              <a:gd name="connsiteX0" fmla="*/ 0 w 4416552"/>
+              <a:gd name="connsiteY0" fmla="*/ 630936 h 3374136"/>
+              <a:gd name="connsiteX1" fmla="*/ 4416552 w 4416552"/>
+              <a:gd name="connsiteY1" fmla="*/ 0 h 3374136"/>
+              <a:gd name="connsiteX2" fmla="*/ 4416552 w 4416552"/>
+              <a:gd name="connsiteY2" fmla="*/ 3374136 h 3374136"/>
+              <a:gd name="connsiteX3" fmla="*/ 0 w 4416552"/>
+              <a:gd name="connsiteY3" fmla="*/ 3374136 h 3374136"/>
+              <a:gd name="connsiteX4" fmla="*/ 0 w 4416552"/>
+              <a:gd name="connsiteY4" fmla="*/ 630936 h 3374136"/>
+            </a:gdLst>
+            <a:ahLst/>
+            <a:cxnLst>
+              <a:cxn ang="0">
+                <a:pos x="connsiteX0" y="connsiteY0"/>
+              </a:cxn>
+              <a:cxn ang="0">
+                <a:pos x="connsiteX1" y="connsiteY1"/>
+              </a:cxn>
+              <a:cxn ang="0">
+                <a:pos x="connsiteX2" y="connsiteY2"/>
+              </a:cxn>
+              <a:cxn ang="0">
+                <a:pos x="connsiteX3" y="connsiteY3"/>
+              </a:cxn>
+              <a:cxn ang="0">
+                <a:pos x="connsiteX4" y="connsiteY4"/>
+              </a:cxn>
+            </a:cxnLst>
+            <a:rect l="l" t="t" r="r" b="b"/>
+            <a:pathLst>
+              <a:path w="4416552" h="3374136">
+                <a:moveTo>
+                  <a:pt x="0" y="630936"/>
+                </a:moveTo>
+                <a:cubicBezTo>
+                  <a:pt x="2517648" y="1633728"/>
+                  <a:pt x="3243072" y="231648"/>
+                  <a:pt x="4416552" y="0"/>
+                </a:cubicBezTo>
+                <a:lnTo>
+                  <a:pt x="4416552" y="3374136"/>
+                </a:lnTo>
+                <a:lnTo>
+                  <a:pt x="0" y="3374136"/>
+                </a:lnTo>
+                <a:lnTo>
+                  <a:pt x="0" y="630936"/>
+                </a:lnTo>
+                <a:close/>
+              </a:path>
+            </a:pathLst>
+          </a:custGeom>
+          <a:solidFill>
+            <a:srgbClr val="B4BCC7"/>
+          </a:solidFill>
+          <a:ln>
+            <a:noFill/>
+          </a:ln>
+          <a:effectLst/>
+        </p:spPr>
+        <p:style>
+          <a:lnRef idx="2">
+            <a:schemeClr val="accent1">
+              <a:shade val="15000"/>
+            </a:schemeClr>
+          </a:lnRef>
+          <a:fillRef idx="1">
+            <a:schemeClr val="accent1"/>
+          </a:fillRef>
+          <a:effectRef idx="0">
+            <a:schemeClr val="accent1"/>
+          </a:effectRef>
+          <a:fontRef idx="minor">
+            <a:schemeClr val="lt1"/>
+          </a:fontRef>
+        </p:style>
+        <p:txBody>
+          <a:bodyPr rtlCol="0" anchor="ctr"/>
+          <a:lstStyle/>
+          <a:p>
+            <a:pPr algn="ctr"/>
+            <a:endParaRPr lang="en-IN" dirty="0"/>
+          </a:p>
+        </p:txBody>
+      </p:sp>
+      <p:sp>
+        <p:nvSpPr>
+          <p:cNvPr id="2" name="Rectangle 3">
+            <a:extLst>
+              <a:ext uri="{FF2B5EF4-FFF2-40B4-BE49-F238E27FC236}">
+                <a16:creationId xmlns:a16="http://schemas.microsoft.com/office/drawing/2014/main" id="{6721C4C6-F669-83AB-12E5-162330169410}"/>
+              </a:ext>
+            </a:extLst>
+          </p:cNvPr>
+          <p:cNvSpPr/>
+          <p:nvPr/>
+        </p:nvSpPr>
+        <p:spPr>
+          <a:xfrm>
+            <a:off x="6638101" y="2980944"/>
+            <a:ext cx="3464052" cy="3657600"/>
+          </a:xfrm>
+          <a:custGeom>
+            <a:avLst/>
+            <a:gdLst>
+              <a:gd name="connsiteX0" fmla="*/ 0 w 4416552"/>
+              <a:gd name="connsiteY0" fmla="*/ 0 h 3374136"/>
+              <a:gd name="connsiteX1" fmla="*/ 4416552 w 4416552"/>
+              <a:gd name="connsiteY1" fmla="*/ 0 h 3374136"/>
+              <a:gd name="connsiteX2" fmla="*/ 4416552 w 4416552"/>
+              <a:gd name="connsiteY2" fmla="*/ 3374136 h 3374136"/>
+              <a:gd name="connsiteX3" fmla="*/ 0 w 4416552"/>
+              <a:gd name="connsiteY3" fmla="*/ 3374136 h 3374136"/>
+              <a:gd name="connsiteX4" fmla="*/ 0 w 4416552"/>
+              <a:gd name="connsiteY4" fmla="*/ 0 h 3374136"/>
+              <a:gd name="connsiteX0" fmla="*/ 896112 w 4416552"/>
+              <a:gd name="connsiteY0" fmla="*/ 694944 h 3374136"/>
+              <a:gd name="connsiteX1" fmla="*/ 4416552 w 4416552"/>
+              <a:gd name="connsiteY1" fmla="*/ 0 h 3374136"/>
+              <a:gd name="connsiteX2" fmla="*/ 4416552 w 4416552"/>
+              <a:gd name="connsiteY2" fmla="*/ 3374136 h 3374136"/>
+              <a:gd name="connsiteX3" fmla="*/ 0 w 4416552"/>
+              <a:gd name="connsiteY3" fmla="*/ 3374136 h 3374136"/>
+              <a:gd name="connsiteX4" fmla="*/ 896112 w 4416552"/>
+              <a:gd name="connsiteY4" fmla="*/ 694944 h 3374136"/>
+              <a:gd name="connsiteX0" fmla="*/ 896112 w 4416552"/>
+              <a:gd name="connsiteY0" fmla="*/ 694944 h 3374136"/>
+              <a:gd name="connsiteX1" fmla="*/ 4416552 w 4416552"/>
+              <a:gd name="connsiteY1" fmla="*/ 0 h 3374136"/>
+              <a:gd name="connsiteX2" fmla="*/ 4416552 w 4416552"/>
+              <a:gd name="connsiteY2" fmla="*/ 3374136 h 3374136"/>
+              <a:gd name="connsiteX3" fmla="*/ 0 w 4416552"/>
+              <a:gd name="connsiteY3" fmla="*/ 3374136 h 3374136"/>
+              <a:gd name="connsiteX4" fmla="*/ 896112 w 4416552"/>
+              <a:gd name="connsiteY4" fmla="*/ 694944 h 3374136"/>
+              <a:gd name="connsiteX0" fmla="*/ 0 w 4480560"/>
+              <a:gd name="connsiteY0" fmla="*/ 621792 h 3374136"/>
+              <a:gd name="connsiteX1" fmla="*/ 4480560 w 4480560"/>
+              <a:gd name="connsiteY1" fmla="*/ 0 h 3374136"/>
+              <a:gd name="connsiteX2" fmla="*/ 4480560 w 4480560"/>
+              <a:gd name="connsiteY2" fmla="*/ 3374136 h 3374136"/>
+              <a:gd name="connsiteX3" fmla="*/ 64008 w 4480560"/>
+              <a:gd name="connsiteY3" fmla="*/ 3374136 h 3374136"/>
+              <a:gd name="connsiteX4" fmla="*/ 0 w 4480560"/>
+              <a:gd name="connsiteY4" fmla="*/ 621792 h 3374136"/>
+              <a:gd name="connsiteX0" fmla="*/ 91440 w 4416552"/>
+              <a:gd name="connsiteY0" fmla="*/ 621792 h 3374136"/>
+              <a:gd name="connsiteX1" fmla="*/ 4416552 w 4416552"/>
+              <a:gd name="connsiteY1" fmla="*/ 0 h 3374136"/>
+              <a:gd name="connsiteX2" fmla="*/ 4416552 w 4416552"/>
+              <a:gd name="connsiteY2" fmla="*/ 3374136 h 3374136"/>
+              <a:gd name="connsiteX3" fmla="*/ 0 w 4416552"/>
+              <a:gd name="connsiteY3" fmla="*/ 3374136 h 3374136"/>
+              <a:gd name="connsiteX4" fmla="*/ 91440 w 4416552"/>
+              <a:gd name="connsiteY4" fmla="*/ 621792 h 3374136"/>
+              <a:gd name="connsiteX0" fmla="*/ 0 w 4416552"/>
+              <a:gd name="connsiteY0" fmla="*/ 630936 h 3374136"/>
+              <a:gd name="connsiteX1" fmla="*/ 4416552 w 4416552"/>
+              <a:gd name="connsiteY1" fmla="*/ 0 h 3374136"/>
+              <a:gd name="connsiteX2" fmla="*/ 4416552 w 4416552"/>
+              <a:gd name="connsiteY2" fmla="*/ 3374136 h 3374136"/>
+              <a:gd name="connsiteX3" fmla="*/ 0 w 4416552"/>
+              <a:gd name="connsiteY3" fmla="*/ 3374136 h 3374136"/>
+              <a:gd name="connsiteX4" fmla="*/ 0 w 4416552"/>
+              <a:gd name="connsiteY4" fmla="*/ 630936 h 3374136"/>
+            </a:gdLst>
+            <a:ahLst/>
+            <a:cxnLst>
+              <a:cxn ang="0">
+                <a:pos x="connsiteX0" y="connsiteY0"/>
+              </a:cxn>
+              <a:cxn ang="0">
+                <a:pos x="connsiteX1" y="connsiteY1"/>
+              </a:cxn>
+              <a:cxn ang="0">
+                <a:pos x="connsiteX2" y="connsiteY2"/>
+              </a:cxn>
+              <a:cxn ang="0">
+                <a:pos x="connsiteX3" y="connsiteY3"/>
+              </a:cxn>
+              <a:cxn ang="0">
+                <a:pos x="connsiteX4" y="connsiteY4"/>
+              </a:cxn>
+            </a:cxnLst>
+            <a:rect l="l" t="t" r="r" b="b"/>
+            <a:pathLst>
+              <a:path w="4416552" h="3374136">
+                <a:moveTo>
+                  <a:pt x="0" y="630936"/>
+                </a:moveTo>
+                <a:cubicBezTo>
+                  <a:pt x="2517648" y="1633728"/>
+                  <a:pt x="3243072" y="231648"/>
+                  <a:pt x="4416552" y="0"/>
+                </a:cubicBezTo>
+                <a:lnTo>
+                  <a:pt x="4416552" y="3374136"/>
+                </a:lnTo>
+                <a:lnTo>
+                  <a:pt x="0" y="3374136"/>
+                </a:lnTo>
+                <a:lnTo>
+                  <a:pt x="0" y="630936"/>
+                </a:lnTo>
+                <a:close/>
+              </a:path>
+            </a:pathLst>
+          </a:custGeom>
+          <a:solidFill>
+            <a:srgbClr val="F1E8EB"/>
+          </a:solidFill>
+          <a:ln>
+            <a:noFill/>
+          </a:ln>
+          <a:effectLst/>
+        </p:spPr>
+        <p:style>
+          <a:lnRef idx="2">
+            <a:schemeClr val="accent1">
+              <a:shade val="15000"/>
+            </a:schemeClr>
+          </a:lnRef>
+          <a:fillRef idx="1">
+            <a:schemeClr val="accent1"/>
+          </a:fillRef>
+          <a:effectRef idx="0">
+            <a:schemeClr val="accent1"/>
+          </a:effectRef>
+          <a:fontRef idx="minor">
+            <a:schemeClr val="lt1"/>
+          </a:fontRef>
+        </p:style>
+        <p:txBody>
+          <a:bodyPr rtlCol="0" anchor="ctr"/>
+          <a:lstStyle/>
+          <a:p>
+            <a:pPr algn="ctr"/>
+            <a:endParaRPr lang="en-IN" dirty="0"/>
+          </a:p>
+        </p:txBody>
+      </p:sp>
     </p:spTree>
     <p:extLst>
       <p:ext uri="{BB962C8B-B14F-4D97-AF65-F5344CB8AC3E}">

</xml_diff>